<commit_message>
Pushing updates to CPN modeling chapter
</commit_message>
<xml_diff>
--- a/src/publications/TEX/SEUS-2015/figs/business_logic_ebnf.pptx
+++ b/src/publications/TEX/SEUS-2015/figs/business_logic_ebnf.pptx
@@ -108,7 +108,18 @@
   </p:defaultTextStyle>
   <p:extLst>
     <p:ext uri="{EFAFB233-063F-42B5-8137-9DF3F51BA10A}">
-      <p15:sldGuideLst xmlns:p15="http://schemas.microsoft.com/office/powerpoint/2012/main" xmlns=""/>
+      <p15:sldGuideLst xmlns:p15="http://schemas.microsoft.com/office/powerpoint/2012/main">
+        <p15:guide id="1" orient="horz" pos="4003">
+          <p15:clr>
+            <a:srgbClr val="A4A3A4"/>
+          </p15:clr>
+        </p15:guide>
+        <p15:guide id="2" pos="3840">
+          <p15:clr>
+            <a:srgbClr val="A4A3A4"/>
+          </p15:clr>
+        </p15:guide>
+      </p15:sldGuideLst>
     </p:ext>
   </p:extLst>
 </p:presentation>
@@ -156,10 +167,9 @@
           </a:lstStyle>
           <a:p>
             <a:r>
-              <a:rPr lang="en-US" smtClean="0"/>
+              <a:rPr lang="en-US"/>
               <a:t>Click to edit Master title style</a:t>
             </a:r>
-            <a:endParaRPr lang="en-US"/>
           </a:p>
         </p:txBody>
       </p:sp>
@@ -221,10 +231,9 @@
           </a:lstStyle>
           <a:p>
             <a:r>
-              <a:rPr lang="en-US" smtClean="0"/>
+              <a:rPr lang="en-US"/>
               <a:t>Click to edit Master subtitle style</a:t>
             </a:r>
-            <a:endParaRPr lang="en-US"/>
           </a:p>
         </p:txBody>
       </p:sp>
@@ -245,7 +254,7 @@
           <a:p>
             <a:fld id="{2608EBEA-88B7-4FD8-9EC6-3399C2F6710F}" type="datetimeFigureOut">
               <a:rPr lang="en-US" smtClean="0"/>
-              <a:t>8/16/2015</a:t>
+              <a:t>5/4/2016</a:t>
             </a:fld>
             <a:endParaRPr lang="en-US"/>
           </a:p>
@@ -339,10 +348,9 @@
           <a:lstStyle/>
           <a:p>
             <a:r>
-              <a:rPr lang="en-US" smtClean="0"/>
+              <a:rPr lang="en-US"/>
               <a:t>Click to edit Master title style</a:t>
             </a:r>
-            <a:endParaRPr lang="en-US"/>
           </a:p>
         </p:txBody>
       </p:sp>
@@ -363,38 +371,37 @@
           <a:p>
             <a:pPr lvl="0"/>
             <a:r>
-              <a:rPr lang="en-US" smtClean="0"/>
+              <a:rPr lang="en-US"/>
               <a:t>Click to edit Master text styles</a:t>
             </a:r>
           </a:p>
           <a:p>
             <a:pPr lvl="1"/>
             <a:r>
-              <a:rPr lang="en-US" smtClean="0"/>
+              <a:rPr lang="en-US"/>
               <a:t>Second level</a:t>
             </a:r>
           </a:p>
           <a:p>
             <a:pPr lvl="2"/>
             <a:r>
-              <a:rPr lang="en-US" smtClean="0"/>
+              <a:rPr lang="en-US"/>
               <a:t>Third level</a:t>
             </a:r>
           </a:p>
           <a:p>
             <a:pPr lvl="3"/>
             <a:r>
-              <a:rPr lang="en-US" smtClean="0"/>
+              <a:rPr lang="en-US"/>
               <a:t>Fourth level</a:t>
             </a:r>
           </a:p>
           <a:p>
             <a:pPr lvl="4"/>
             <a:r>
-              <a:rPr lang="en-US" smtClean="0"/>
+              <a:rPr lang="en-US"/>
               <a:t>Fifth level</a:t>
             </a:r>
-            <a:endParaRPr lang="en-US"/>
           </a:p>
         </p:txBody>
       </p:sp>
@@ -415,7 +422,7 @@
           <a:p>
             <a:fld id="{2608EBEA-88B7-4FD8-9EC6-3399C2F6710F}" type="datetimeFigureOut">
               <a:rPr lang="en-US" smtClean="0"/>
-              <a:t>8/16/2015</a:t>
+              <a:t>5/4/2016</a:t>
             </a:fld>
             <a:endParaRPr lang="en-US"/>
           </a:p>
@@ -514,10 +521,9 @@
           <a:lstStyle/>
           <a:p>
             <a:r>
-              <a:rPr lang="en-US" smtClean="0"/>
+              <a:rPr lang="en-US"/>
               <a:t>Click to edit Master title style</a:t>
             </a:r>
-            <a:endParaRPr lang="en-US"/>
           </a:p>
         </p:txBody>
       </p:sp>
@@ -543,38 +549,37 @@
           <a:p>
             <a:pPr lvl="0"/>
             <a:r>
-              <a:rPr lang="en-US" smtClean="0"/>
+              <a:rPr lang="en-US"/>
               <a:t>Click to edit Master text styles</a:t>
             </a:r>
           </a:p>
           <a:p>
             <a:pPr lvl="1"/>
             <a:r>
-              <a:rPr lang="en-US" smtClean="0"/>
+              <a:rPr lang="en-US"/>
               <a:t>Second level</a:t>
             </a:r>
           </a:p>
           <a:p>
             <a:pPr lvl="2"/>
             <a:r>
-              <a:rPr lang="en-US" smtClean="0"/>
+              <a:rPr lang="en-US"/>
               <a:t>Third level</a:t>
             </a:r>
           </a:p>
           <a:p>
             <a:pPr lvl="3"/>
             <a:r>
-              <a:rPr lang="en-US" smtClean="0"/>
+              <a:rPr lang="en-US"/>
               <a:t>Fourth level</a:t>
             </a:r>
           </a:p>
           <a:p>
             <a:pPr lvl="4"/>
             <a:r>
-              <a:rPr lang="en-US" smtClean="0"/>
+              <a:rPr lang="en-US"/>
               <a:t>Fifth level</a:t>
             </a:r>
-            <a:endParaRPr lang="en-US"/>
           </a:p>
         </p:txBody>
       </p:sp>
@@ -595,7 +600,7 @@
           <a:p>
             <a:fld id="{2608EBEA-88B7-4FD8-9EC6-3399C2F6710F}" type="datetimeFigureOut">
               <a:rPr lang="en-US" smtClean="0"/>
-              <a:t>8/16/2015</a:t>
+              <a:t>5/4/2016</a:t>
             </a:fld>
             <a:endParaRPr lang="en-US"/>
           </a:p>
@@ -689,10 +694,9 @@
           <a:lstStyle/>
           <a:p>
             <a:r>
-              <a:rPr lang="en-US" smtClean="0"/>
+              <a:rPr lang="en-US"/>
               <a:t>Click to edit Master title style</a:t>
             </a:r>
-            <a:endParaRPr lang="en-US"/>
           </a:p>
         </p:txBody>
       </p:sp>
@@ -713,38 +717,37 @@
           <a:p>
             <a:pPr lvl="0"/>
             <a:r>
-              <a:rPr lang="en-US" smtClean="0"/>
+              <a:rPr lang="en-US"/>
               <a:t>Click to edit Master text styles</a:t>
             </a:r>
           </a:p>
           <a:p>
             <a:pPr lvl="1"/>
             <a:r>
-              <a:rPr lang="en-US" smtClean="0"/>
+              <a:rPr lang="en-US"/>
               <a:t>Second level</a:t>
             </a:r>
           </a:p>
           <a:p>
             <a:pPr lvl="2"/>
             <a:r>
-              <a:rPr lang="en-US" smtClean="0"/>
+              <a:rPr lang="en-US"/>
               <a:t>Third level</a:t>
             </a:r>
           </a:p>
           <a:p>
             <a:pPr lvl="3"/>
             <a:r>
-              <a:rPr lang="en-US" smtClean="0"/>
+              <a:rPr lang="en-US"/>
               <a:t>Fourth level</a:t>
             </a:r>
           </a:p>
           <a:p>
             <a:pPr lvl="4"/>
             <a:r>
-              <a:rPr lang="en-US" smtClean="0"/>
+              <a:rPr lang="en-US"/>
               <a:t>Fifth level</a:t>
             </a:r>
-            <a:endParaRPr lang="en-US"/>
           </a:p>
         </p:txBody>
       </p:sp>
@@ -765,7 +768,7 @@
           <a:p>
             <a:fld id="{2608EBEA-88B7-4FD8-9EC6-3399C2F6710F}" type="datetimeFigureOut">
               <a:rPr lang="en-US" smtClean="0"/>
-              <a:t>8/16/2015</a:t>
+              <a:t>5/4/2016</a:t>
             </a:fld>
             <a:endParaRPr lang="en-US"/>
           </a:p>
@@ -868,10 +871,9 @@
           </a:lstStyle>
           <a:p>
             <a:r>
-              <a:rPr lang="en-US" smtClean="0"/>
+              <a:rPr lang="en-US"/>
               <a:t>Click to edit Master title style</a:t>
             </a:r>
-            <a:endParaRPr lang="en-US"/>
           </a:p>
         </p:txBody>
       </p:sp>
@@ -988,7 +990,7 @@
           <a:p>
             <a:pPr lvl="0"/>
             <a:r>
-              <a:rPr lang="en-US" smtClean="0"/>
+              <a:rPr lang="en-US"/>
               <a:t>Click to edit Master text styles</a:t>
             </a:r>
           </a:p>
@@ -1011,7 +1013,7 @@
           <a:p>
             <a:fld id="{2608EBEA-88B7-4FD8-9EC6-3399C2F6710F}" type="datetimeFigureOut">
               <a:rPr lang="en-US" smtClean="0"/>
-              <a:t>8/16/2015</a:t>
+              <a:t>5/4/2016</a:t>
             </a:fld>
             <a:endParaRPr lang="en-US"/>
           </a:p>
@@ -1105,10 +1107,9 @@
           <a:lstStyle/>
           <a:p>
             <a:r>
-              <a:rPr lang="en-US" smtClean="0"/>
+              <a:rPr lang="en-US"/>
               <a:t>Click to edit Master title style</a:t>
             </a:r>
-            <a:endParaRPr lang="en-US"/>
           </a:p>
         </p:txBody>
       </p:sp>
@@ -1134,38 +1135,37 @@
           <a:p>
             <a:pPr lvl="0"/>
             <a:r>
-              <a:rPr lang="en-US" smtClean="0"/>
+              <a:rPr lang="en-US"/>
               <a:t>Click to edit Master text styles</a:t>
             </a:r>
           </a:p>
           <a:p>
             <a:pPr lvl="1"/>
             <a:r>
-              <a:rPr lang="en-US" smtClean="0"/>
+              <a:rPr lang="en-US"/>
               <a:t>Second level</a:t>
             </a:r>
           </a:p>
           <a:p>
             <a:pPr lvl="2"/>
             <a:r>
-              <a:rPr lang="en-US" smtClean="0"/>
+              <a:rPr lang="en-US"/>
               <a:t>Third level</a:t>
             </a:r>
           </a:p>
           <a:p>
             <a:pPr lvl="3"/>
             <a:r>
-              <a:rPr lang="en-US" smtClean="0"/>
+              <a:rPr lang="en-US"/>
               <a:t>Fourth level</a:t>
             </a:r>
           </a:p>
           <a:p>
             <a:pPr lvl="4"/>
             <a:r>
-              <a:rPr lang="en-US" smtClean="0"/>
+              <a:rPr lang="en-US"/>
               <a:t>Fifth level</a:t>
             </a:r>
-            <a:endParaRPr lang="en-US"/>
           </a:p>
         </p:txBody>
       </p:sp>
@@ -1191,38 +1191,37 @@
           <a:p>
             <a:pPr lvl="0"/>
             <a:r>
-              <a:rPr lang="en-US" smtClean="0"/>
+              <a:rPr lang="en-US"/>
               <a:t>Click to edit Master text styles</a:t>
             </a:r>
           </a:p>
           <a:p>
             <a:pPr lvl="1"/>
             <a:r>
-              <a:rPr lang="en-US" smtClean="0"/>
+              <a:rPr lang="en-US"/>
               <a:t>Second level</a:t>
             </a:r>
           </a:p>
           <a:p>
             <a:pPr lvl="2"/>
             <a:r>
-              <a:rPr lang="en-US" smtClean="0"/>
+              <a:rPr lang="en-US"/>
               <a:t>Third level</a:t>
             </a:r>
           </a:p>
           <a:p>
             <a:pPr lvl="3"/>
             <a:r>
-              <a:rPr lang="en-US" smtClean="0"/>
+              <a:rPr lang="en-US"/>
               <a:t>Fourth level</a:t>
             </a:r>
           </a:p>
           <a:p>
             <a:pPr lvl="4"/>
             <a:r>
-              <a:rPr lang="en-US" smtClean="0"/>
+              <a:rPr lang="en-US"/>
               <a:t>Fifth level</a:t>
             </a:r>
-            <a:endParaRPr lang="en-US"/>
           </a:p>
         </p:txBody>
       </p:sp>
@@ -1243,7 +1242,7 @@
           <a:p>
             <a:fld id="{2608EBEA-88B7-4FD8-9EC6-3399C2F6710F}" type="datetimeFigureOut">
               <a:rPr lang="en-US" smtClean="0"/>
-              <a:t>8/16/2015</a:t>
+              <a:t>5/4/2016</a:t>
             </a:fld>
             <a:endParaRPr lang="en-US"/>
           </a:p>
@@ -1342,10 +1341,9 @@
           <a:lstStyle/>
           <a:p>
             <a:r>
-              <a:rPr lang="en-US" smtClean="0"/>
+              <a:rPr lang="en-US"/>
               <a:t>Click to edit Master title style</a:t>
             </a:r>
-            <a:endParaRPr lang="en-US"/>
           </a:p>
         </p:txBody>
       </p:sp>
@@ -1408,7 +1406,7 @@
           <a:p>
             <a:pPr lvl="0"/>
             <a:r>
-              <a:rPr lang="en-US" smtClean="0"/>
+              <a:rPr lang="en-US"/>
               <a:t>Click to edit Master text styles</a:t>
             </a:r>
           </a:p>
@@ -1436,38 +1434,37 @@
           <a:p>
             <a:pPr lvl="0"/>
             <a:r>
-              <a:rPr lang="en-US" smtClean="0"/>
+              <a:rPr lang="en-US"/>
               <a:t>Click to edit Master text styles</a:t>
             </a:r>
           </a:p>
           <a:p>
             <a:pPr lvl="1"/>
             <a:r>
-              <a:rPr lang="en-US" smtClean="0"/>
+              <a:rPr lang="en-US"/>
               <a:t>Second level</a:t>
             </a:r>
           </a:p>
           <a:p>
             <a:pPr lvl="2"/>
             <a:r>
-              <a:rPr lang="en-US" smtClean="0"/>
+              <a:rPr lang="en-US"/>
               <a:t>Third level</a:t>
             </a:r>
           </a:p>
           <a:p>
             <a:pPr lvl="3"/>
             <a:r>
-              <a:rPr lang="en-US" smtClean="0"/>
+              <a:rPr lang="en-US"/>
               <a:t>Fourth level</a:t>
             </a:r>
           </a:p>
           <a:p>
             <a:pPr lvl="4"/>
             <a:r>
-              <a:rPr lang="en-US" smtClean="0"/>
+              <a:rPr lang="en-US"/>
               <a:t>Fifth level</a:t>
             </a:r>
-            <a:endParaRPr lang="en-US"/>
           </a:p>
         </p:txBody>
       </p:sp>
@@ -1530,7 +1527,7 @@
           <a:p>
             <a:pPr lvl="0"/>
             <a:r>
-              <a:rPr lang="en-US" smtClean="0"/>
+              <a:rPr lang="en-US"/>
               <a:t>Click to edit Master text styles</a:t>
             </a:r>
           </a:p>
@@ -1558,38 +1555,37 @@
           <a:p>
             <a:pPr lvl="0"/>
             <a:r>
-              <a:rPr lang="en-US" smtClean="0"/>
+              <a:rPr lang="en-US"/>
               <a:t>Click to edit Master text styles</a:t>
             </a:r>
           </a:p>
           <a:p>
             <a:pPr lvl="1"/>
             <a:r>
-              <a:rPr lang="en-US" smtClean="0"/>
+              <a:rPr lang="en-US"/>
               <a:t>Second level</a:t>
             </a:r>
           </a:p>
           <a:p>
             <a:pPr lvl="2"/>
             <a:r>
-              <a:rPr lang="en-US" smtClean="0"/>
+              <a:rPr lang="en-US"/>
               <a:t>Third level</a:t>
             </a:r>
           </a:p>
           <a:p>
             <a:pPr lvl="3"/>
             <a:r>
-              <a:rPr lang="en-US" smtClean="0"/>
+              <a:rPr lang="en-US"/>
               <a:t>Fourth level</a:t>
             </a:r>
           </a:p>
           <a:p>
             <a:pPr lvl="4"/>
             <a:r>
-              <a:rPr lang="en-US" smtClean="0"/>
+              <a:rPr lang="en-US"/>
               <a:t>Fifth level</a:t>
             </a:r>
-            <a:endParaRPr lang="en-US"/>
           </a:p>
         </p:txBody>
       </p:sp>
@@ -1610,7 +1606,7 @@
           <a:p>
             <a:fld id="{2608EBEA-88B7-4FD8-9EC6-3399C2F6710F}" type="datetimeFigureOut">
               <a:rPr lang="en-US" smtClean="0"/>
-              <a:t>8/16/2015</a:t>
+              <a:t>5/4/2016</a:t>
             </a:fld>
             <a:endParaRPr lang="en-US"/>
           </a:p>
@@ -1704,10 +1700,9 @@
           <a:lstStyle/>
           <a:p>
             <a:r>
-              <a:rPr lang="en-US" smtClean="0"/>
+              <a:rPr lang="en-US"/>
               <a:t>Click to edit Master title style</a:t>
             </a:r>
-            <a:endParaRPr lang="en-US"/>
           </a:p>
         </p:txBody>
       </p:sp>
@@ -1728,7 +1723,7 @@
           <a:p>
             <a:fld id="{2608EBEA-88B7-4FD8-9EC6-3399C2F6710F}" type="datetimeFigureOut">
               <a:rPr lang="en-US" smtClean="0"/>
-              <a:t>8/16/2015</a:t>
+              <a:t>5/4/2016</a:t>
             </a:fld>
             <a:endParaRPr lang="en-US"/>
           </a:p>
@@ -1823,7 +1818,7 @@
           <a:p>
             <a:fld id="{2608EBEA-88B7-4FD8-9EC6-3399C2F6710F}" type="datetimeFigureOut">
               <a:rPr lang="en-US" smtClean="0"/>
-              <a:t>8/16/2015</a:t>
+              <a:t>5/4/2016</a:t>
             </a:fld>
             <a:endParaRPr lang="en-US"/>
           </a:p>
@@ -1926,10 +1921,9 @@
           </a:lstStyle>
           <a:p>
             <a:r>
-              <a:rPr lang="en-US" smtClean="0"/>
+              <a:rPr lang="en-US"/>
               <a:t>Click to edit Master title style</a:t>
             </a:r>
-            <a:endParaRPr lang="en-US"/>
           </a:p>
         </p:txBody>
       </p:sp>
@@ -1983,38 +1977,37 @@
           <a:p>
             <a:pPr lvl="0"/>
             <a:r>
-              <a:rPr lang="en-US" smtClean="0"/>
+              <a:rPr lang="en-US"/>
               <a:t>Click to edit Master text styles</a:t>
             </a:r>
           </a:p>
           <a:p>
             <a:pPr lvl="1"/>
             <a:r>
-              <a:rPr lang="en-US" smtClean="0"/>
+              <a:rPr lang="en-US"/>
               <a:t>Second level</a:t>
             </a:r>
           </a:p>
           <a:p>
             <a:pPr lvl="2"/>
             <a:r>
-              <a:rPr lang="en-US" smtClean="0"/>
+              <a:rPr lang="en-US"/>
               <a:t>Third level</a:t>
             </a:r>
           </a:p>
           <a:p>
             <a:pPr lvl="3"/>
             <a:r>
-              <a:rPr lang="en-US" smtClean="0"/>
+              <a:rPr lang="en-US"/>
               <a:t>Fourth level</a:t>
             </a:r>
           </a:p>
           <a:p>
             <a:pPr lvl="4"/>
             <a:r>
-              <a:rPr lang="en-US" smtClean="0"/>
+              <a:rPr lang="en-US"/>
               <a:t>Fifth level</a:t>
             </a:r>
-            <a:endParaRPr lang="en-US"/>
           </a:p>
         </p:txBody>
       </p:sp>
@@ -2077,7 +2070,7 @@
           <a:p>
             <a:pPr lvl="0"/>
             <a:r>
-              <a:rPr lang="en-US" smtClean="0"/>
+              <a:rPr lang="en-US"/>
               <a:t>Click to edit Master text styles</a:t>
             </a:r>
           </a:p>
@@ -2100,7 +2093,7 @@
           <a:p>
             <a:fld id="{2608EBEA-88B7-4FD8-9EC6-3399C2F6710F}" type="datetimeFigureOut">
               <a:rPr lang="en-US" smtClean="0"/>
-              <a:t>8/16/2015</a:t>
+              <a:t>5/4/2016</a:t>
             </a:fld>
             <a:endParaRPr lang="en-US"/>
           </a:p>
@@ -2203,10 +2196,9 @@
           </a:lstStyle>
           <a:p>
             <a:r>
-              <a:rPr lang="en-US" smtClean="0"/>
+              <a:rPr lang="en-US"/>
               <a:t>Click to edit Master title style</a:t>
             </a:r>
-            <a:endParaRPr lang="en-US"/>
           </a:p>
         </p:txBody>
       </p:sp>
@@ -2330,7 +2322,7 @@
           <a:p>
             <a:pPr lvl="0"/>
             <a:r>
-              <a:rPr lang="en-US" smtClean="0"/>
+              <a:rPr lang="en-US"/>
               <a:t>Click to edit Master text styles</a:t>
             </a:r>
           </a:p>
@@ -2353,7 +2345,7 @@
           <a:p>
             <a:fld id="{2608EBEA-88B7-4FD8-9EC6-3399C2F6710F}" type="datetimeFigureOut">
               <a:rPr lang="en-US" smtClean="0"/>
-              <a:t>8/16/2015</a:t>
+              <a:t>5/4/2016</a:t>
             </a:fld>
             <a:endParaRPr lang="en-US"/>
           </a:p>
@@ -2462,10 +2454,9 @@
           <a:lstStyle/>
           <a:p>
             <a:r>
-              <a:rPr lang="en-US" smtClean="0"/>
+              <a:rPr lang="en-US"/>
               <a:t>Click to edit Master title style</a:t>
             </a:r>
-            <a:endParaRPr lang="en-US"/>
           </a:p>
         </p:txBody>
       </p:sp>
@@ -2496,38 +2487,37 @@
           <a:p>
             <a:pPr lvl="0"/>
             <a:r>
-              <a:rPr lang="en-US" smtClean="0"/>
+              <a:rPr lang="en-US"/>
               <a:t>Click to edit Master text styles</a:t>
             </a:r>
           </a:p>
           <a:p>
             <a:pPr lvl="1"/>
             <a:r>
-              <a:rPr lang="en-US" smtClean="0"/>
+              <a:rPr lang="en-US"/>
               <a:t>Second level</a:t>
             </a:r>
           </a:p>
           <a:p>
             <a:pPr lvl="2"/>
             <a:r>
-              <a:rPr lang="en-US" smtClean="0"/>
+              <a:rPr lang="en-US"/>
               <a:t>Third level</a:t>
             </a:r>
           </a:p>
           <a:p>
             <a:pPr lvl="3"/>
             <a:r>
-              <a:rPr lang="en-US" smtClean="0"/>
+              <a:rPr lang="en-US"/>
               <a:t>Fourth level</a:t>
             </a:r>
           </a:p>
           <a:p>
             <a:pPr lvl="4"/>
             <a:r>
-              <a:rPr lang="en-US" smtClean="0"/>
+              <a:rPr lang="en-US"/>
               <a:t>Fifth level</a:t>
             </a:r>
-            <a:endParaRPr lang="en-US"/>
           </a:p>
         </p:txBody>
       </p:sp>
@@ -2566,7 +2556,7 @@
           <a:p>
             <a:fld id="{2608EBEA-88B7-4FD8-9EC6-3399C2F6710F}" type="datetimeFigureOut">
               <a:rPr lang="en-US" smtClean="0"/>
-              <a:t>8/16/2015</a:t>
+              <a:t>5/4/2016</a:t>
             </a:fld>
             <a:endParaRPr lang="en-US"/>
           </a:p>
@@ -3000,13 +2990,6 @@
   <p:clrMapOvr>
     <a:masterClrMapping/>
   </p:clrMapOvr>
-  <p:timing>
-    <p:tnLst>
-      <p:par>
-        <p:cTn id="1" dur="indefinite" restart="never" nodeType="tmRoot"/>
-      </p:par>
-    </p:tnLst>
-  </p:timing>
 </p:sld>
 </file>
 
@@ -3035,8 +3018,8 @@
         </p:nvSpPr>
         <p:spPr>
           <a:xfrm>
-            <a:off x="440267" y="282435"/>
-            <a:ext cx="11579937" cy="8125301"/>
+            <a:off x="456693" y="266008"/>
+            <a:ext cx="11579937" cy="6463308"/>
           </a:xfrm>
           <a:prstGeom prst="rect">
             <a:avLst/>
@@ -3050,7 +3033,7 @@
           <a:lstStyle/>
           <a:p>
             <a:r>
-              <a:rPr lang="en-US" dirty="0" smtClean="0">
+              <a:rPr lang="en-US" dirty="0">
                 <a:solidFill>
                   <a:srgbClr val="C00000"/>
                 </a:solidFill>
@@ -3058,7 +3041,7 @@
               <a:t>(* </a:t>
             </a:r>
             <a:r>
-              <a:rPr lang="en-US" b="1" dirty="0" smtClean="0">
+              <a:rPr lang="en-US" b="1" dirty="0">
                 <a:solidFill>
                   <a:srgbClr val="C00000"/>
                 </a:solidFill>
@@ -3066,7 +3049,7 @@
               <a:t>Business Logic syntax in Extended Backus-Naur Form </a:t>
             </a:r>
             <a:r>
-              <a:rPr lang="en-US" dirty="0" smtClean="0">
+              <a:rPr lang="en-US" dirty="0">
                 <a:solidFill>
                   <a:srgbClr val="C00000"/>
                 </a:solidFill>
@@ -3076,57 +3059,29 @@
           </a:p>
           <a:p>
             <a:r>
-              <a:rPr lang="en-US" dirty="0" smtClean="0"/>
+              <a:rPr lang="en-US" dirty="0"/>
               <a:t>business_logic                 = 	‘</a:t>
             </a:r>
             <a:r>
-              <a:rPr lang="en-US" b="1" dirty="0" smtClean="0">
+              <a:rPr lang="en-US" b="1" dirty="0">
                 <a:solidFill>
                   <a:srgbClr val="3333FF"/>
                 </a:solidFill>
               </a:rPr>
-              <a:t>Do</a:t>
-            </a:r>
-            <a:r>
-              <a:rPr lang="en-US" dirty="0" smtClean="0"/>
+              <a:t>do</a:t>
+            </a:r>
+            <a:r>
+              <a:rPr lang="en-US" dirty="0"/>
               <a:t>’, ws, operation_name, ws</a:t>
             </a:r>
           </a:p>
           <a:p>
             <a:r>
               <a:rPr lang="en-US" dirty="0"/>
-              <a:t>	 </a:t>
-            </a:r>
-            <a:r>
-              <a:rPr lang="en-US" dirty="0" smtClean="0"/>
-              <a:t>             		‘</a:t>
-            </a:r>
-            <a:r>
-              <a:rPr lang="en-US" b="1" dirty="0" smtClean="0">
-                <a:solidFill>
-                  <a:srgbClr val="3333FF"/>
-                </a:solidFill>
-              </a:rPr>
-              <a:t>[</a:t>
-            </a:r>
-            <a:r>
-              <a:rPr lang="en-US" dirty="0" smtClean="0"/>
-              <a:t>’, operation_priority, operation_deadline, ‘</a:t>
-            </a:r>
-            <a:r>
-              <a:rPr lang="en-US" b="1" dirty="0" smtClean="0">
-                <a:solidFill>
-                  <a:srgbClr val="3333FF"/>
-                </a:solidFill>
-              </a:rPr>
-              <a:t>]</a:t>
-            </a:r>
-            <a:r>
-              <a:rPr lang="en-US" dirty="0" smtClean="0"/>
-              <a:t>’, ‘</a:t>
-            </a:r>
-            <a:r>
-              <a:rPr lang="en-US" b="1" dirty="0" smtClean="0">
+              <a:t>	              		 ‘</a:t>
+            </a:r>
+            <a:r>
+              <a:rPr lang="en-US" b="1" dirty="0">
                 <a:solidFill>
                   <a:srgbClr val="3333FF"/>
                 </a:solidFill>
@@ -3134,11 +3089,11 @@
               <a:t>{</a:t>
             </a:r>
             <a:r>
-              <a:rPr lang="en-US" b="1" dirty="0" smtClean="0"/>
+              <a:rPr lang="en-US" b="1" dirty="0"/>
               <a:t>‘, </a:t>
             </a:r>
             <a:r>
-              <a:rPr lang="en-US" dirty="0" smtClean="0">
+              <a:rPr lang="en-US" dirty="0">
                 <a:solidFill>
                   <a:schemeClr val="tx1">
                     <a:lumMod val="65000"/>
@@ -3149,11 +3104,11 @@
               <a:t>{ functional_step }, </a:t>
             </a:r>
             <a:r>
-              <a:rPr lang="en-US" dirty="0" smtClean="0"/>
+              <a:rPr lang="en-US" dirty="0"/>
               <a:t>‘</a:t>
             </a:r>
             <a:r>
-              <a:rPr lang="en-US" b="1" dirty="0" smtClean="0">
+              <a:rPr lang="en-US" b="1" dirty="0">
                 <a:solidFill>
                   <a:srgbClr val="3333FF"/>
                 </a:solidFill>
@@ -3161,43 +3116,20 @@
               <a:t>};</a:t>
             </a:r>
             <a:r>
-              <a:rPr lang="en-US" dirty="0" smtClean="0"/>
+              <a:rPr lang="en-US" dirty="0"/>
               <a:t>’ ;</a:t>
             </a:r>
           </a:p>
           <a:p>
             <a:r>
-              <a:rPr lang="en-US" dirty="0" smtClean="0"/>
+              <a:rPr lang="en-US" dirty="0"/>
               <a:t>operation_name	        =	ID ;</a:t>
             </a:r>
           </a:p>
           <a:p>
             <a:r>
-              <a:rPr lang="en-US" dirty="0" smtClean="0"/>
-              <a:t>operation_priority 	        =	INT ;</a:t>
-            </a:r>
-          </a:p>
-          <a:p>
-            <a:r>
-              <a:rPr lang="en-US" dirty="0" smtClean="0"/>
-              <a:t>operation_deadline	        = 	INT ;</a:t>
-            </a:r>
-          </a:p>
-          <a:p>
-            <a:r>
-              <a:rPr lang="en-US" dirty="0" smtClean="0"/>
+              <a:rPr lang="en-US" dirty="0"/>
               <a:t>functional_step	        = 	{</a:t>
-            </a:r>
-            <a:r>
-              <a:rPr lang="en-US" dirty="0" smtClean="0">
-                <a:solidFill>
-                  <a:schemeClr val="tx1">
-                    <a:lumMod val="65000"/>
-                    <a:lumOff val="35000"/>
-                  </a:schemeClr>
-                </a:solidFill>
-              </a:rPr>
-              <a:t>sequential_code_block | rmi_call | ami_call | dds_publish | dds_pull</a:t>
             </a:r>
             <a:r>
               <a:rPr lang="en-US" dirty="0">
@@ -3208,45 +3140,46 @@
                   </a:schemeClr>
                 </a:solidFill>
               </a:rPr>
-              <a:t>_</a:t>
-            </a:r>
-            <a:r>
-              <a:rPr lang="en-US" dirty="0" smtClean="0">
+              <a:t>sequential_code_block | rmi_call | ami_call | publish| loop</a:t>
+            </a:r>
+            <a:r>
+              <a:rPr lang="en-US" dirty="0"/>
+              <a:t>} ;</a:t>
+            </a:r>
+          </a:p>
+          <a:p>
+            <a:r>
+              <a:rPr lang="en-US" dirty="0"/>
+              <a:t>sequential_code_block  = 	‘</a:t>
+            </a:r>
+            <a:r>
+              <a:rPr lang="en-US" b="1" dirty="0">
                 <a:solidFill>
-                  <a:schemeClr val="tx1">
-                    <a:lumMod val="65000"/>
-                    <a:lumOff val="35000"/>
-                  </a:schemeClr>
+                  <a:srgbClr val="3333FF"/>
                 </a:solidFill>
               </a:rPr>
-              <a:t>subscribe | 						dds_push_subscribe | loop</a:t>
-            </a:r>
-            <a:r>
-              <a:rPr lang="en-US" dirty="0" smtClean="0"/>
-              <a:t>} ;</a:t>
-            </a:r>
-          </a:p>
-          <a:p>
-            <a:r>
-              <a:rPr lang="en-US" dirty="0" smtClean="0"/>
-              <a:t>sequential_code_block  = 	INT, ‘</a:t>
-            </a:r>
-            <a:r>
-              <a:rPr lang="en-US" b="1" dirty="0" smtClean="0"/>
+              <a:t>LOCAL</a:t>
+            </a:r>
+            <a:r>
+              <a:rPr lang="en-US" dirty="0"/>
+              <a:t>’ INT, ‘</a:t>
+            </a:r>
+            <a:r>
+              <a:rPr lang="en-US" b="1" dirty="0"/>
               <a:t>;</a:t>
             </a:r>
             <a:r>
-              <a:rPr lang="en-US" dirty="0" smtClean="0"/>
+              <a:rPr lang="en-US" dirty="0"/>
               <a:t>’ ;</a:t>
             </a:r>
           </a:p>
           <a:p>
             <a:r>
-              <a:rPr lang="en-US" dirty="0" smtClean="0"/>
+              <a:rPr lang="en-US" dirty="0"/>
               <a:t>rmi call		        = 	‘</a:t>
             </a:r>
             <a:r>
-              <a:rPr lang="en-US" b="1" dirty="0" smtClean="0">
+              <a:rPr lang="en-US" b="1" dirty="0">
                 <a:solidFill>
                   <a:srgbClr val="3333FF"/>
                 </a:solidFill>
@@ -3254,19 +3187,19 @@
               <a:t>RMI</a:t>
             </a:r>
             <a:r>
-              <a:rPr lang="en-US" dirty="0" smtClean="0"/>
+              <a:rPr lang="en-US" dirty="0"/>
               <a:t>’, ws, receptacle_port, ‘</a:t>
             </a:r>
             <a:r>
-              <a:rPr lang="en-US" b="1" dirty="0" smtClean="0"/>
+              <a:rPr lang="en-US" b="1" dirty="0"/>
               <a:t>.</a:t>
             </a:r>
             <a:r>
-              <a:rPr lang="en-US" dirty="0" smtClean="0"/>
-              <a:t>’, remote_operation, ‘</a:t>
-            </a:r>
-            <a:r>
-              <a:rPr lang="en-US" b="1" dirty="0" smtClean="0">
+              <a:rPr lang="en-US" dirty="0"/>
+              <a:t>’, remote_operation, (‘</a:t>
+            </a:r>
+            <a:r>
+              <a:rPr lang="en-US" b="1" dirty="0">
                 <a:solidFill>
                   <a:srgbClr val="3333FF"/>
                 </a:solidFill>
@@ -3274,11 +3207,11 @@
               <a:t>[</a:t>
             </a:r>
             <a:r>
-              <a:rPr lang="en-US" dirty="0" smtClean="0"/>
+              <a:rPr lang="en-US" dirty="0"/>
               <a:t>’ query_time, processing_time ‘</a:t>
             </a:r>
             <a:r>
-              <a:rPr lang="en-US" b="1" dirty="0" smtClean="0">
+              <a:rPr lang="en-US" b="1" dirty="0">
                 <a:solidFill>
                   <a:srgbClr val="3333FF"/>
                 </a:solidFill>
@@ -3286,17 +3219,17 @@
               <a:t>];</a:t>
             </a:r>
             <a:r>
-              <a:rPr lang="en-US" dirty="0" smtClean="0"/>
-              <a:t>’ ;</a:t>
-            </a:r>
-          </a:p>
-          <a:p>
-            <a:r>
-              <a:rPr lang="en-US" dirty="0" smtClean="0"/>
+              <a:rPr lang="en-US" dirty="0"/>
+              <a:t>’)?;</a:t>
+            </a:r>
+          </a:p>
+          <a:p>
+            <a:r>
+              <a:rPr lang="en-US" dirty="0"/>
               <a:t>ami call		        = 	‘</a:t>
             </a:r>
             <a:r>
-              <a:rPr lang="en-US" b="1" dirty="0" smtClean="0">
+              <a:rPr lang="en-US" b="1" dirty="0">
                 <a:solidFill>
                   <a:srgbClr val="3333FF"/>
                 </a:solidFill>
@@ -3304,19 +3237,19 @@
               <a:t>AMI</a:t>
             </a:r>
             <a:r>
-              <a:rPr lang="en-US" dirty="0" smtClean="0"/>
+              <a:rPr lang="en-US" dirty="0"/>
               <a:t>’, ws, receptacle_port, ‘</a:t>
             </a:r>
             <a:r>
-              <a:rPr lang="en-US" b="1" dirty="0" smtClean="0"/>
+              <a:rPr lang="en-US" b="1" dirty="0"/>
               <a:t>.</a:t>
             </a:r>
             <a:r>
-              <a:rPr lang="en-US" dirty="0" smtClean="0"/>
-              <a:t>’, remote_operation, ‘</a:t>
-            </a:r>
-            <a:r>
-              <a:rPr lang="en-US" b="1" dirty="0" smtClean="0">
+              <a:rPr lang="en-US" dirty="0"/>
+              <a:t>’, remote_operation, (‘</a:t>
+            </a:r>
+            <a:r>
+              <a:rPr lang="en-US" b="1" dirty="0">
                 <a:solidFill>
                   <a:srgbClr val="3333FF"/>
                 </a:solidFill>
@@ -3324,11 +3257,11 @@
               <a:t>[</a:t>
             </a:r>
             <a:r>
-              <a:rPr lang="en-US" dirty="0" smtClean="0"/>
+              <a:rPr lang="en-US" dirty="0"/>
               <a:t>’ query_time, processing_time ‘</a:t>
             </a:r>
             <a:r>
-              <a:rPr lang="en-US" b="1" dirty="0" smtClean="0">
+              <a:rPr lang="en-US" b="1" dirty="0">
                 <a:solidFill>
                   <a:srgbClr val="3333FF"/>
                 </a:solidFill>
@@ -3336,45 +3269,37 @@
               <a:t>];</a:t>
             </a:r>
             <a:r>
-              <a:rPr lang="en-US" dirty="0" smtClean="0"/>
-              <a:t>’ ;</a:t>
-            </a:r>
-          </a:p>
-          <a:p>
-            <a:r>
-              <a:rPr lang="en-US" dirty="0" smtClean="0"/>
-              <a:t>dds publish	</a:t>
-            </a:r>
-            <a:r>
-              <a:rPr lang="en-US" dirty="0"/>
-              <a:t>  </a:t>
-            </a:r>
-            <a:r>
-              <a:rPr lang="en-US" dirty="0" smtClean="0"/>
-              <a:t>      = 	‘</a:t>
-            </a:r>
-            <a:r>
-              <a:rPr lang="en-US" b="1" dirty="0" smtClean="0">
+              <a:rPr lang="en-US" dirty="0"/>
+              <a:t>’)?;</a:t>
+            </a:r>
+          </a:p>
+          <a:p>
+            <a:r>
+              <a:rPr lang="en-US" dirty="0"/>
+              <a:t>publish		        = 	‘</a:t>
+            </a:r>
+            <a:r>
+              <a:rPr lang="en-US" b="1" dirty="0">
                 <a:solidFill>
                   <a:srgbClr val="3333FF"/>
                 </a:solidFill>
               </a:rPr>
-              <a:t>DDS_Publish</a:t>
-            </a:r>
-            <a:r>
-              <a:rPr lang="en-US" dirty="0" smtClean="0"/>
-              <a:t>’, ws, dds_port, ‘</a:t>
-            </a:r>
-            <a:r>
-              <a:rPr lang="en-US" b="1" dirty="0" smtClean="0"/>
+              <a:t>PUBLISH</a:t>
+            </a:r>
+            <a:r>
+              <a:rPr lang="en-US" dirty="0"/>
+              <a:t>’, ws, publisher_port, ‘</a:t>
+            </a:r>
+            <a:r>
+              <a:rPr lang="en-US" b="1" dirty="0"/>
               <a:t>.</a:t>
             </a:r>
             <a:r>
-              <a:rPr lang="en-US" dirty="0" smtClean="0"/>
-              <a:t>’, topic, ‘</a:t>
-            </a:r>
-            <a:r>
-              <a:rPr lang="en-US" b="1" dirty="0" smtClean="0">
+              <a:rPr lang="en-US" dirty="0"/>
+              <a:t>’, topic, (‘</a:t>
+            </a:r>
+            <a:r>
+              <a:rPr lang="en-US" b="1" dirty="0">
                 <a:solidFill>
                   <a:srgbClr val="3333FF"/>
                 </a:solidFill>
@@ -3382,11 +3307,11 @@
               <a:t>[</a:t>
             </a:r>
             <a:r>
-              <a:rPr lang="en-US" dirty="0" smtClean="0"/>
+              <a:rPr lang="en-US" dirty="0"/>
               <a:t>’, publish_time, ‘</a:t>
             </a:r>
             <a:r>
-              <a:rPr lang="en-US" b="1" dirty="0" smtClean="0">
+              <a:rPr lang="en-US" b="1" dirty="0">
                 <a:solidFill>
                   <a:srgbClr val="3333FF"/>
                 </a:solidFill>
@@ -3394,37 +3319,29 @@
               <a:t>];</a:t>
             </a:r>
             <a:r>
-              <a:rPr lang="en-US" dirty="0" smtClean="0"/>
-              <a:t>’ ;</a:t>
-            </a:r>
-          </a:p>
-          <a:p>
-            <a:r>
-              <a:rPr lang="en-US" dirty="0" smtClean="0"/>
-              <a:t>dds pull subscribe	        =	‘</a:t>
-            </a:r>
-            <a:r>
-              <a:rPr lang="en-US" b="1" dirty="0" smtClean="0">
+              <a:rPr lang="en-US" dirty="0"/>
+              <a:t>’)? ;</a:t>
+            </a:r>
+          </a:p>
+          <a:p>
+            <a:r>
+              <a:rPr lang="en-US" dirty="0"/>
+              <a:t>loop		        =	‘</a:t>
+            </a:r>
+            <a:r>
+              <a:rPr lang="en-US" b="1" dirty="0">
                 <a:solidFill>
                   <a:srgbClr val="3333FF"/>
                 </a:solidFill>
               </a:rPr>
-              <a:t>DDS_Pull_Subscribe</a:t>
-            </a:r>
-            <a:r>
-              <a:rPr lang="en-US" dirty="0" smtClean="0"/>
-              <a:t>’, ws, dds_port, '</a:t>
-            </a:r>
-            <a:r>
-              <a:rPr lang="en-US" b="1" dirty="0" smtClean="0"/>
-              <a:t>.</a:t>
-            </a:r>
-            <a:r>
-              <a:rPr lang="en-US" dirty="0" smtClean="0"/>
-              <a:t>‘, topic, '</a:t>
-            </a:r>
-            <a:r>
-              <a:rPr lang="en-US" b="1" dirty="0" smtClean="0">
+              <a:t>LOOP</a:t>
+            </a:r>
+            <a:r>
+              <a:rPr lang="en-US" dirty="0"/>
+              <a:t>’, ws, ‘</a:t>
+            </a:r>
+            <a:r>
+              <a:rPr lang="en-US" b="1" dirty="0">
                 <a:solidFill>
                   <a:srgbClr val="3333FF"/>
                 </a:solidFill>
@@ -3432,103 +3349,11 @@
               <a:t>[</a:t>
             </a:r>
             <a:r>
-              <a:rPr lang="en-US" dirty="0" smtClean="0"/>
-              <a:t>‘, processing_time, '</a:t>
-            </a:r>
-            <a:r>
-              <a:rPr lang="en-US" b="1" dirty="0" smtClean="0">
-                <a:solidFill>
-                  <a:srgbClr val="3333FF"/>
-                </a:solidFill>
-              </a:rPr>
-              <a:t>];</a:t>
-            </a:r>
-            <a:r>
-              <a:rPr lang="en-US" dirty="0" smtClean="0"/>
-              <a:t>’ ;</a:t>
-            </a:r>
-          </a:p>
-          <a:p>
-            <a:r>
-              <a:rPr lang="en-US" dirty="0" smtClean="0"/>
-              <a:t>dds_push_subscribe       =	‘</a:t>
-            </a:r>
-            <a:r>
-              <a:rPr lang="en-US" b="1" dirty="0" smtClean="0">
-                <a:solidFill>
-                  <a:srgbClr val="3333FF"/>
-                </a:solidFill>
-              </a:rPr>
-              <a:t>DDS_Push_Subscribe</a:t>
-            </a:r>
-            <a:r>
-              <a:rPr lang="en-US" dirty="0" smtClean="0"/>
-              <a:t>’, ws, dds_port, ‘</a:t>
-            </a:r>
-            <a:r>
-              <a:rPr lang="en-US" b="1" dirty="0" smtClean="0"/>
-              <a:t>.</a:t>
-            </a:r>
-            <a:r>
-              <a:rPr lang="en-US" dirty="0" smtClean="0"/>
-              <a:t>’, topic, ‘</a:t>
-            </a:r>
-            <a:r>
-              <a:rPr lang="en-US" b="1" dirty="0" smtClean="0">
-                <a:solidFill>
-                  <a:srgbClr val="3333FF"/>
-                </a:solidFill>
-              </a:rPr>
-              <a:t>[</a:t>
-            </a:r>
-            <a:r>
-              <a:rPr lang="en-US" dirty="0" smtClean="0"/>
-              <a:t>’ processing_time, ‘</a:t>
-            </a:r>
-            <a:r>
-              <a:rPr lang="en-US" b="1" dirty="0" smtClean="0">
-                <a:solidFill>
-                  <a:srgbClr val="3333FF"/>
-                </a:solidFill>
-              </a:rPr>
-              <a:t>];</a:t>
-            </a:r>
-            <a:r>
-              <a:rPr lang="en-US" dirty="0" smtClean="0"/>
-              <a:t>’ ;</a:t>
-            </a:r>
-          </a:p>
-          <a:p>
-            <a:r>
-              <a:rPr lang="en-US" dirty="0" smtClean="0"/>
-              <a:t>loop		        =	‘</a:t>
-            </a:r>
-            <a:r>
-              <a:rPr lang="en-US" b="1" dirty="0" smtClean="0">
-                <a:solidFill>
-                  <a:srgbClr val="3333FF"/>
-                </a:solidFill>
-              </a:rPr>
-              <a:t>LOOP</a:t>
-            </a:r>
-            <a:r>
-              <a:rPr lang="en-US" dirty="0" smtClean="0"/>
-              <a:t>’, ws, ‘</a:t>
-            </a:r>
-            <a:r>
-              <a:rPr lang="en-US" b="1" dirty="0" smtClean="0">
-                <a:solidFill>
-                  <a:srgbClr val="3333FF"/>
-                </a:solidFill>
-              </a:rPr>
-              <a:t>[</a:t>
-            </a:r>
-            <a:r>
-              <a:rPr lang="en-US" dirty="0" smtClean="0"/>
+              <a:rPr lang="en-US" dirty="0"/>
               <a:t>’, count, ‘</a:t>
             </a:r>
             <a:r>
-              <a:rPr lang="en-US" b="1" dirty="0" smtClean="0">
+              <a:rPr lang="en-US" b="1" dirty="0">
                 <a:solidFill>
                   <a:srgbClr val="3333FF"/>
                 </a:solidFill>
@@ -3536,11 +3361,17 @@
               <a:t>]</a:t>
             </a:r>
             <a:r>
-              <a:rPr lang="en-US" dirty="0" smtClean="0"/>
-              <a:t>’, ws, ‘</a:t>
-            </a:r>
-            <a:r>
-              <a:rPr lang="en-US" b="1" dirty="0" smtClean="0">
+              <a:rPr lang="en-US" dirty="0"/>
+              <a:t>’, ws, </a:t>
+            </a:r>
+          </a:p>
+          <a:p>
+            <a:r>
+              <a:rPr lang="en-US" dirty="0"/>
+              <a:t>                                                    ‘</a:t>
+            </a:r>
+            <a:r>
+              <a:rPr lang="en-US" b="1" dirty="0">
                 <a:solidFill>
                   <a:srgbClr val="3333FF"/>
                 </a:solidFill>
@@ -3548,11 +3379,11 @@
               <a:t>{</a:t>
             </a:r>
             <a:r>
-              <a:rPr lang="en-US" dirty="0" smtClean="0"/>
+              <a:rPr lang="en-US" dirty="0"/>
               <a:t>‘, {</a:t>
             </a:r>
             <a:r>
-              <a:rPr lang="en-US" dirty="0" smtClean="0">
+              <a:rPr lang="en-US" dirty="0">
                 <a:solidFill>
                   <a:schemeClr val="tx1">
                     <a:lumMod val="65000"/>
@@ -3563,11 +3394,11 @@
               <a:t>functional_step</a:t>
             </a:r>
             <a:r>
-              <a:rPr lang="en-US" dirty="0" smtClean="0"/>
+              <a:rPr lang="en-US" dirty="0"/>
               <a:t>}, ‘</a:t>
             </a:r>
             <a:r>
-              <a:rPr lang="en-US" b="1" dirty="0" smtClean="0">
+              <a:rPr lang="en-US" b="1" dirty="0">
                 <a:solidFill>
                   <a:srgbClr val="3333FF"/>
                 </a:solidFill>
@@ -3575,77 +3406,77 @@
               <a:t>};</a:t>
             </a:r>
             <a:r>
-              <a:rPr lang="en-US" dirty="0" smtClean="0"/>
+              <a:rPr lang="en-US" dirty="0"/>
               <a:t>’ ;</a:t>
             </a:r>
           </a:p>
           <a:p>
             <a:r>
-              <a:rPr lang="en-US" dirty="0" smtClean="0"/>
+              <a:rPr lang="en-US" dirty="0"/>
               <a:t>receptacle_port	        =  	ID ;</a:t>
             </a:r>
           </a:p>
           <a:p>
             <a:r>
-              <a:rPr lang="en-US" dirty="0" smtClean="0"/>
+              <a:rPr lang="en-US" dirty="0"/>
               <a:t>remote_operation  	        =	ID ;</a:t>
             </a:r>
           </a:p>
           <a:p>
             <a:r>
-              <a:rPr lang="en-US" dirty="0" smtClean="0"/>
-              <a:t>dds_port		        =	ID ;</a:t>
-            </a:r>
-          </a:p>
-          <a:p>
-            <a:r>
-              <a:rPr lang="en-US" dirty="0" smtClean="0"/>
+              <a:rPr lang="en-US" dirty="0"/>
+              <a:t>publisher_port 	        =	ID ;</a:t>
+            </a:r>
+          </a:p>
+          <a:p>
+            <a:r>
+              <a:rPr lang="en-US" dirty="0"/>
               <a:t>topic		        = 	ID;</a:t>
             </a:r>
           </a:p>
           <a:p>
             <a:r>
-              <a:rPr lang="en-US" dirty="0" smtClean="0"/>
+              <a:rPr lang="en-US" dirty="0"/>
               <a:t>query_time	        = 	INT ;</a:t>
             </a:r>
           </a:p>
           <a:p>
             <a:r>
-              <a:rPr lang="en-US" dirty="0" smtClean="0"/>
+              <a:rPr lang="en-US" dirty="0"/>
               <a:t>processing_time	        = 	INT ;</a:t>
             </a:r>
           </a:p>
           <a:p>
             <a:r>
-              <a:rPr lang="en-US" dirty="0" smtClean="0"/>
+              <a:rPr lang="en-US" dirty="0"/>
               <a:t>publish_time	        = 	INT ;</a:t>
             </a:r>
           </a:p>
           <a:p>
             <a:r>
-              <a:rPr lang="en-US" dirty="0" smtClean="0"/>
+              <a:rPr lang="en-US" dirty="0"/>
               <a:t>count		        =	INT;</a:t>
             </a:r>
           </a:p>
           <a:p>
             <a:r>
-              <a:rPr lang="en-US" dirty="0" smtClean="0"/>
+              <a:rPr lang="en-US" dirty="0"/>
               <a:t>ws		        =	? white space characters ?</a:t>
             </a:r>
           </a:p>
           <a:p>
             <a:r>
-              <a:rPr lang="en-US" dirty="0" smtClean="0"/>
+              <a:rPr lang="en-US" dirty="0"/>
               <a:t>identifier		= 	alphabetic character, { alphabetic character | digit } ;</a:t>
             </a:r>
           </a:p>
           <a:p>
             <a:r>
-              <a:rPr lang="en-US" dirty="0" smtClean="0"/>
+              <a:rPr lang="en-US" dirty="0"/>
               <a:t>Integer		=	digit, {</a:t>
             </a:r>
             <a:r>
-              <a:rPr lang="en-US" dirty="0" smtClean="0">
+              <a:rPr lang="en-US" dirty="0">
                 <a:solidFill>
                   <a:schemeClr val="tx1">
                     <a:lumMod val="65000"/>
@@ -3656,29 +3487,15 @@
               <a:t>digit</a:t>
             </a:r>
             <a:r>
-              <a:rPr lang="en-US" dirty="0" smtClean="0"/>
+              <a:rPr lang="en-US" dirty="0"/>
               <a:t>} ;</a:t>
             </a:r>
           </a:p>
           <a:p>
             <a:r>
               <a:rPr lang="en-US" dirty="0"/>
-              <a:t>d</a:t>
-            </a:r>
-            <a:r>
-              <a:rPr lang="en-US" dirty="0" smtClean="0"/>
-              <a:t>igit		= 	“0” | “1” | “2” | “3” | “4” | “5” | “6” | “7” | “8” | “9” ;</a:t>
-            </a:r>
-          </a:p>
-          <a:p>
-            <a:endParaRPr lang="en-US" dirty="0" smtClean="0"/>
-          </a:p>
-          <a:p>
-            <a:r>
-              <a:rPr lang="en-US" dirty="0"/>
-              <a:t>	</a:t>
-            </a:r>
-            <a:endParaRPr lang="en-US" dirty="0" smtClean="0"/>
+              <a:t>digit		= 	“0” | “1” | “2” | “3” | “4” | “5” | “6” | “7” | “8” | “9” ;</a:t>
+            </a:r>
           </a:p>
         </p:txBody>
       </p:sp>
@@ -3692,13 +3509,6 @@
   <p:clrMapOvr>
     <a:masterClrMapping/>
   </p:clrMapOvr>
-  <p:timing>
-    <p:tnLst>
-      <p:par>
-        <p:cTn id="1" dur="indefinite" restart="never" nodeType="tmRoot"/>
-      </p:par>
-    </p:tnLst>
-  </p:timing>
 </p:sld>
 </file>
 
@@ -3729,13 +3539,6 @@
   <p:clrMapOvr>
     <a:masterClrMapping/>
   </p:clrMapOvr>
-  <p:timing>
-    <p:tnLst>
-      <p:par>
-        <p:cTn id="1" dur="indefinite" restart="never" nodeType="tmRoot"/>
-      </p:par>
-    </p:tnLst>
-  </p:timing>
 </p:sld>
 </file>
 
@@ -3994,7 +3797,7 @@
   <a:extraClrSchemeLst/>
   <a:extLst>
     <a:ext uri="{05A4C25C-085E-4340-85A3-A5531E510DB2}">
-      <thm15:themeFamily xmlns:thm15="http://schemas.microsoft.com/office/thememl/2012/main" xmlns="" name="Office Theme" id="{62F939B6-93AF-4DB8-9C6B-D6C7DFDC589F}" vid="{4A3C46E8-61CC-4603-A589-7422A47A8E4A}"/>
+      <thm15:themeFamily xmlns:thm15="http://schemas.microsoft.com/office/thememl/2012/main" name="Office Theme" id="{62F939B6-93AF-4DB8-9C6B-D6C7DFDC589F}" vid="{4A3C46E8-61CC-4603-A589-7422A47A8E4A}"/>
     </a:ext>
   </a:extLst>
 </a:theme>

</xml_diff>